<commit_message>
2021년 10월  8일 금 오후  4:51:25
</commit_message>
<xml_diff>
--- a/project/3) 파이널 프로젝트/다양한 추천 알고리즘을 활용한 영화 추천 시스템.pptx
+++ b/project/3) 파이널 프로젝트/다양한 추천 알고리즘을 활용한 영화 추천 시스템.pptx
@@ -7,8 +7,11 @@
   <p:sldIdLst>
     <p:sldId id="256" r:id="rId2"/>
     <p:sldId id="257" r:id="rId3"/>
-    <p:sldId id="259" r:id="rId4"/>
-    <p:sldId id="258" r:id="rId5"/>
+    <p:sldId id="258" r:id="rId4"/>
+    <p:sldId id="260" r:id="rId5"/>
+    <p:sldId id="259" r:id="rId6"/>
+    <p:sldId id="261" r:id="rId7"/>
+    <p:sldId id="262" r:id="rId8"/>
   </p:sldIdLst>
   <p:sldSz cx="12192000" cy="6858000"/>
   <p:notesSz cx="6858000" cy="9144000"/>
@@ -107,6 +110,11 @@
       </a:defRPr>
     </a:lvl9pPr>
   </p:defaultTextStyle>
+  <p:extLst>
+    <p:ext uri="{EFAFB233-063F-42B5-8137-9DF3F51BA10A}">
+      <p15:sldGuideLst xmlns:p15="http://schemas.microsoft.com/office/powerpoint/2012/main"/>
+    </p:ext>
+  </p:extLst>
 </p:presentation>
 </file>
 
@@ -257,7 +265,7 @@
           <a:p>
             <a:fld id="{82F01886-E80E-432B-9696-E511B938F199}" type="datetimeFigureOut">
               <a:rPr lang="ko-KR" altLang="en-US" smtClean="0"/>
-              <a:t>2021-10-06</a:t>
+              <a:t>2021-10-08</a:t>
             </a:fld>
             <a:endParaRPr lang="ko-KR" altLang="en-US"/>
           </a:p>
@@ -455,7 +463,7 @@
           <a:p>
             <a:fld id="{82F01886-E80E-432B-9696-E511B938F199}" type="datetimeFigureOut">
               <a:rPr lang="ko-KR" altLang="en-US" smtClean="0"/>
-              <a:t>2021-10-06</a:t>
+              <a:t>2021-10-08</a:t>
             </a:fld>
             <a:endParaRPr lang="ko-KR" altLang="en-US"/>
           </a:p>
@@ -663,7 +671,7 @@
           <a:p>
             <a:fld id="{82F01886-E80E-432B-9696-E511B938F199}" type="datetimeFigureOut">
               <a:rPr lang="ko-KR" altLang="en-US" smtClean="0"/>
-              <a:t>2021-10-06</a:t>
+              <a:t>2021-10-08</a:t>
             </a:fld>
             <a:endParaRPr lang="ko-KR" altLang="en-US"/>
           </a:p>
@@ -861,7 +869,7 @@
           <a:p>
             <a:fld id="{82F01886-E80E-432B-9696-E511B938F199}" type="datetimeFigureOut">
               <a:rPr lang="ko-KR" altLang="en-US" smtClean="0"/>
-              <a:t>2021-10-06</a:t>
+              <a:t>2021-10-08</a:t>
             </a:fld>
             <a:endParaRPr lang="ko-KR" altLang="en-US"/>
           </a:p>
@@ -1136,7 +1144,7 @@
           <a:p>
             <a:fld id="{82F01886-E80E-432B-9696-E511B938F199}" type="datetimeFigureOut">
               <a:rPr lang="ko-KR" altLang="en-US" smtClean="0"/>
-              <a:t>2021-10-06</a:t>
+              <a:t>2021-10-08</a:t>
             </a:fld>
             <a:endParaRPr lang="ko-KR" altLang="en-US"/>
           </a:p>
@@ -1401,7 +1409,7 @@
           <a:p>
             <a:fld id="{82F01886-E80E-432B-9696-E511B938F199}" type="datetimeFigureOut">
               <a:rPr lang="ko-KR" altLang="en-US" smtClean="0"/>
-              <a:t>2021-10-06</a:t>
+              <a:t>2021-10-08</a:t>
             </a:fld>
             <a:endParaRPr lang="ko-KR" altLang="en-US"/>
           </a:p>
@@ -1813,7 +1821,7 @@
           <a:p>
             <a:fld id="{82F01886-E80E-432B-9696-E511B938F199}" type="datetimeFigureOut">
               <a:rPr lang="ko-KR" altLang="en-US" smtClean="0"/>
-              <a:t>2021-10-06</a:t>
+              <a:t>2021-10-08</a:t>
             </a:fld>
             <a:endParaRPr lang="ko-KR" altLang="en-US"/>
           </a:p>
@@ -1954,7 +1962,7 @@
           <a:p>
             <a:fld id="{82F01886-E80E-432B-9696-E511B938F199}" type="datetimeFigureOut">
               <a:rPr lang="ko-KR" altLang="en-US" smtClean="0"/>
-              <a:t>2021-10-06</a:t>
+              <a:t>2021-10-08</a:t>
             </a:fld>
             <a:endParaRPr lang="ko-KR" altLang="en-US"/>
           </a:p>
@@ -2067,7 +2075,7 @@
           <a:p>
             <a:fld id="{82F01886-E80E-432B-9696-E511B938F199}" type="datetimeFigureOut">
               <a:rPr lang="ko-KR" altLang="en-US" smtClean="0"/>
-              <a:t>2021-10-06</a:t>
+              <a:t>2021-10-08</a:t>
             </a:fld>
             <a:endParaRPr lang="ko-KR" altLang="en-US"/>
           </a:p>
@@ -2378,7 +2386,7 @@
           <a:p>
             <a:fld id="{82F01886-E80E-432B-9696-E511B938F199}" type="datetimeFigureOut">
               <a:rPr lang="ko-KR" altLang="en-US" smtClean="0"/>
-              <a:t>2021-10-06</a:t>
+              <a:t>2021-10-08</a:t>
             </a:fld>
             <a:endParaRPr lang="ko-KR" altLang="en-US"/>
           </a:p>
@@ -2666,7 +2674,7 @@
           <a:p>
             <a:fld id="{82F01886-E80E-432B-9696-E511B938F199}" type="datetimeFigureOut">
               <a:rPr lang="ko-KR" altLang="en-US" smtClean="0"/>
-              <a:t>2021-10-06</a:t>
+              <a:t>2021-10-08</a:t>
             </a:fld>
             <a:endParaRPr lang="ko-KR" altLang="en-US"/>
           </a:p>
@@ -2907,7 +2915,7 @@
           <a:p>
             <a:fld id="{82F01886-E80E-432B-9696-E511B938F199}" type="datetimeFigureOut">
               <a:rPr lang="ko-KR" altLang="en-US" smtClean="0"/>
-              <a:t>2021-10-06</a:t>
+              <a:t>2021-10-08</a:t>
             </a:fld>
             <a:endParaRPr lang="ko-KR" altLang="en-US"/>
           </a:p>
@@ -3430,8 +3438,8 @@
         </p:nvSpPr>
         <p:spPr>
           <a:xfrm>
-            <a:off x="1742114" y="2416029"/>
-            <a:ext cx="9144000" cy="3266980"/>
+            <a:off x="1524000" y="2421081"/>
+            <a:ext cx="9362114" cy="3261927"/>
           </a:xfrm>
         </p:spPr>
         <p:txBody>
@@ -3440,7 +3448,14 @@
           <a:p>
             <a:r>
               <a:rPr lang="ko-KR" altLang="en-US" dirty="0"/>
-              <a:t>광고를 하기 위해서 중요해진 추천 알고리즘 </a:t>
+              <a:t>광고를 하기 위해서 중요해진 추천 알고리즘</a:t>
+            </a:r>
+            <a:endParaRPr lang="en-US" altLang="ko-KR" dirty="0"/>
+          </a:p>
+          <a:p>
+            <a:r>
+              <a:rPr lang="ko-KR" altLang="en-US" dirty="0"/>
+              <a:t> </a:t>
             </a:r>
             <a:r>
               <a:rPr lang="en-US" altLang="ko-KR" dirty="0"/>
@@ -3461,15 +3476,14 @@
           <a:p>
             <a:r>
               <a:rPr lang="ko-KR" altLang="en-US" dirty="0"/>
-              <a:t>다양한 추천 알고리즘 모델을 활용해보고 본인의 취향에 맞는 영화를 </a:t>
-            </a:r>
-            <a:r>
-              <a:rPr lang="ko-KR" altLang="en-US" dirty="0" err="1"/>
-              <a:t>추천받아</a:t>
-            </a:r>
+              <a:t>다양한 추천 알고리즘 모델을 활용해보고</a:t>
+            </a:r>
+            <a:endParaRPr lang="en-US" altLang="ko-KR" dirty="0"/>
+          </a:p>
+          <a:p>
             <a:r>
               <a:rPr lang="ko-KR" altLang="en-US" dirty="0"/>
-              <a:t> 본다</a:t>
+              <a:t> 본인의 취향에 맞는 영화를 추천 받아 본다</a:t>
             </a:r>
             <a:r>
               <a:rPr lang="en-US" altLang="ko-KR" dirty="0"/>
@@ -3535,14 +3549,6 @@
 <file path=ppt/slides/slide3.xml><?xml version="1.0" encoding="utf-8"?>
 <p:sld xmlns:a="http://schemas.openxmlformats.org/drawingml/2006/main" xmlns:r="http://schemas.openxmlformats.org/officeDocument/2006/relationships" xmlns:p="http://schemas.openxmlformats.org/presentationml/2006/main">
   <p:cSld>
-    <p:bg>
-      <p:bgPr>
-        <a:solidFill>
-          <a:schemeClr val="bg1"/>
-        </a:solidFill>
-        <a:effectLst/>
-      </p:bgPr>
-    </p:bg>
     <p:spTree>
       <p:nvGrpSpPr>
         <p:cNvPr id="1" name=""/>
@@ -3557,89 +3563,101 @@
           <a:chExt cx="0" cy="0"/>
         </a:xfrm>
       </p:grpSpPr>
-      <p:pic>
-        <p:nvPicPr>
-          <p:cNvPr id="4" name="내용 개체 틀 3" descr="테이블이(가) 표시된 사진&#10;&#10;자동 생성된 설명">
-            <a:extLst>
-              <a:ext uri="{FF2B5EF4-FFF2-40B4-BE49-F238E27FC236}">
-                <a16:creationId xmlns:a16="http://schemas.microsoft.com/office/drawing/2014/main" id="{3BBAF44D-00B7-4202-A784-5E0F2219B1AA}"/>
-              </a:ext>
-            </a:extLst>
-          </p:cNvPr>
-          <p:cNvPicPr>
-            <a:picLocks noGrp="1" noChangeAspect="1"/>
-          </p:cNvPicPr>
-          <p:nvPr>
-            <p:ph idx="1"/>
-          </p:nvPr>
-        </p:nvPicPr>
-        <p:blipFill>
-          <a:blip r:embed="rId2"/>
-          <a:stretch>
-            <a:fillRect/>
-          </a:stretch>
-        </p:blipFill>
+      <p:sp>
+        <p:nvSpPr>
+          <p:cNvPr id="2" name="제목 1">
+            <a:extLst>
+              <a:ext uri="{FF2B5EF4-FFF2-40B4-BE49-F238E27FC236}">
+                <a16:creationId xmlns:a16="http://schemas.microsoft.com/office/drawing/2014/main" id="{02C9F9A2-34A3-4663-AD60-41ED3AF04627}"/>
+              </a:ext>
+            </a:extLst>
+          </p:cNvPr>
+          <p:cNvSpPr>
+            <a:spLocks noGrp="1"/>
+          </p:cNvSpPr>
+          <p:nvPr>
+            <p:ph type="ctrTitle"/>
+          </p:nvPr>
+        </p:nvSpPr>
         <p:spPr>
           <a:xfrm>
-            <a:off x="2868188" y="1417739"/>
-            <a:ext cx="6455624" cy="4803318"/>
-          </a:xfrm>
-          <a:prstGeom prst="rect">
-            <a:avLst/>
-          </a:prstGeom>
-        </p:spPr>
-      </p:pic>
-      <p:sp>
-        <p:nvSpPr>
-          <p:cNvPr id="12" name="제목 1">
-            <a:extLst>
-              <a:ext uri="{FF2B5EF4-FFF2-40B4-BE49-F238E27FC236}">
-                <a16:creationId xmlns:a16="http://schemas.microsoft.com/office/drawing/2014/main" id="{059B3125-B858-4F61-8C63-1C213214D5EB}"/>
-              </a:ext>
-            </a:extLst>
-          </p:cNvPr>
-          <p:cNvSpPr txBox="1">
-            <a:spLocks/>
-          </p:cNvSpPr>
-          <p:nvPr/>
-        </p:nvSpPr>
-        <p:spPr>
-          <a:xfrm>
-            <a:off x="1524000" y="728080"/>
+            <a:off x="1524000" y="1122363"/>
             <a:ext cx="9144000" cy="1100720"/>
           </a:xfrm>
-          <a:prstGeom prst="rect">
-            <a:avLst/>
-          </a:prstGeom>
         </p:spPr>
         <p:txBody>
-          <a:bodyPr vert="horz" lIns="91440" tIns="45720" rIns="91440" bIns="45720" rtlCol="0" anchor="ctr">
+          <a:bodyPr/>
+          <a:lstStyle/>
+          <a:p>
+            <a:r>
+              <a:rPr lang="ko-KR" altLang="en-US" dirty="0"/>
+              <a:t>관련 데이터</a:t>
+            </a:r>
+          </a:p>
+        </p:txBody>
+      </p:sp>
+      <p:sp>
+        <p:nvSpPr>
+          <p:cNvPr id="3" name="부제목 2">
+            <a:extLst>
+              <a:ext uri="{FF2B5EF4-FFF2-40B4-BE49-F238E27FC236}">
+                <a16:creationId xmlns:a16="http://schemas.microsoft.com/office/drawing/2014/main" id="{7354ACF4-5100-4CAE-969D-51E31E7F696B}"/>
+              </a:ext>
+            </a:extLst>
+          </p:cNvPr>
+          <p:cNvSpPr>
+            <a:spLocks noGrp="1"/>
+          </p:cNvSpPr>
+          <p:nvPr>
+            <p:ph type="subTitle" idx="1"/>
+          </p:nvPr>
+        </p:nvSpPr>
+        <p:spPr/>
+        <p:txBody>
+          <a:bodyPr>
             <a:normAutofit/>
           </a:bodyPr>
-          <a:lstStyle>
-            <a:lvl1pPr algn="l" defTabSz="914400" rtl="0" eaLnBrk="1" latinLnBrk="1" hangingPunct="1">
-              <a:lnSpc>
-                <a:spcPct val="90000"/>
-              </a:lnSpc>
-              <a:spcBef>
-                <a:spcPct val="0"/>
-              </a:spcBef>
-              <a:buNone/>
-              <a:defRPr sz="4400" kern="1200">
+          <a:lstStyle/>
+          <a:p>
+            <a:r>
+              <a:rPr lang="en-US" altLang="ko-KR" b="1" i="0" dirty="0">
                 <a:solidFill>
-                  <a:schemeClr val="tx1"/>
+                  <a:srgbClr val="000000"/>
                 </a:solidFill>
-                <a:latin typeface="+mj-lt"/>
-                <a:ea typeface="+mj-ea"/>
-                <a:cs typeface="+mj-cs"/>
-              </a:defRPr>
-            </a:lvl1pPr>
-          </a:lstStyle>
-          <a:p>
-            <a:pPr algn="ctr"/>
-            <a:r>
-              <a:rPr lang="ko-KR" altLang="en-US" dirty="0"/>
-              <a:t>알고리즘 예시</a:t>
+                <a:effectLst/>
+                <a:latin typeface="Noto Sans KR"/>
+                <a:hlinkClick r:id="rId2"/>
+              </a:rPr>
+              <a:t>https://grouplens.org/datasets/movielens/</a:t>
+            </a:r>
+            <a:endParaRPr lang="en-US" altLang="ko-KR" b="1" i="0" dirty="0">
+              <a:solidFill>
+                <a:srgbClr val="000000"/>
+              </a:solidFill>
+              <a:effectLst/>
+              <a:latin typeface="Noto Sans KR"/>
+            </a:endParaRPr>
+          </a:p>
+          <a:p>
+            <a:r>
+              <a:rPr lang="en-US" altLang="ko-KR" b="1" dirty="0">
+                <a:solidFill>
+                  <a:srgbClr val="000000"/>
+                </a:solidFill>
+                <a:latin typeface="Noto Sans KR"/>
+              </a:rPr>
+              <a:t>IMDB API</a:t>
+            </a:r>
+          </a:p>
+          <a:p>
+            <a:r>
+              <a:rPr lang="en-US" altLang="ko-KR" b="1" dirty="0">
+                <a:solidFill>
+                  <a:srgbClr val="000000"/>
+                </a:solidFill>
+                <a:latin typeface="Noto Sans KR"/>
+              </a:rPr>
+              <a:t>TMDB API</a:t>
             </a:r>
           </a:p>
         </p:txBody>
@@ -3647,7 +3665,7 @@
     </p:spTree>
     <p:extLst>
       <p:ext uri="{BB962C8B-B14F-4D97-AF65-F5344CB8AC3E}">
-        <p14:creationId xmlns:p14="http://schemas.microsoft.com/office/powerpoint/2010/main" val="1142723946"/>
+        <p14:creationId xmlns:p14="http://schemas.microsoft.com/office/powerpoint/2010/main" val="1401117775"/>
       </p:ext>
     </p:extLst>
   </p:cSld>
@@ -3679,51 +3697,23 @@
           <p:cNvPr id="2" name="제목 1">
             <a:extLst>
               <a:ext uri="{FF2B5EF4-FFF2-40B4-BE49-F238E27FC236}">
-                <a16:creationId xmlns:a16="http://schemas.microsoft.com/office/drawing/2014/main" id="{02C9F9A2-34A3-4663-AD60-41ED3AF04627}"/>
-              </a:ext>
-            </a:extLst>
-          </p:cNvPr>
-          <p:cNvSpPr>
-            <a:spLocks noGrp="1"/>
-          </p:cNvSpPr>
-          <p:nvPr>
-            <p:ph type="ctrTitle"/>
+                <a16:creationId xmlns:a16="http://schemas.microsoft.com/office/drawing/2014/main" id="{56CC3392-B59E-4C77-BF17-F88CFCD9787D}"/>
+              </a:ext>
+            </a:extLst>
+          </p:cNvPr>
+          <p:cNvSpPr>
+            <a:spLocks noGrp="1"/>
+          </p:cNvSpPr>
+          <p:nvPr>
+            <p:ph type="title"/>
           </p:nvPr>
         </p:nvSpPr>
         <p:spPr>
           <a:xfrm>
-            <a:off x="1524000" y="1122363"/>
-            <a:ext cx="9144000" cy="1100720"/>
+            <a:off x="1692954" y="218539"/>
+            <a:ext cx="1518749" cy="923348"/>
           </a:xfrm>
         </p:spPr>
-        <p:txBody>
-          <a:bodyPr/>
-          <a:lstStyle/>
-          <a:p>
-            <a:r>
-              <a:rPr lang="ko-KR" altLang="en-US" dirty="0"/>
-              <a:t>관련 데이터</a:t>
-            </a:r>
-          </a:p>
-        </p:txBody>
-      </p:sp>
-      <p:sp>
-        <p:nvSpPr>
-          <p:cNvPr id="3" name="부제목 2">
-            <a:extLst>
-              <a:ext uri="{FF2B5EF4-FFF2-40B4-BE49-F238E27FC236}">
-                <a16:creationId xmlns:a16="http://schemas.microsoft.com/office/drawing/2014/main" id="{7354ACF4-5100-4CAE-969D-51E31E7F696B}"/>
-              </a:ext>
-            </a:extLst>
-          </p:cNvPr>
-          <p:cNvSpPr>
-            <a:spLocks noGrp="1"/>
-          </p:cNvSpPr>
-          <p:nvPr>
-            <p:ph type="subTitle" idx="1"/>
-          </p:nvPr>
-        </p:nvSpPr>
-        <p:spPr/>
         <p:txBody>
           <a:bodyPr>
             <a:normAutofit/>
@@ -3731,23 +3721,998 @@
           <a:lstStyle/>
           <a:p>
             <a:r>
-              <a:rPr lang="en-US" altLang="ko-KR" b="1" i="0" dirty="0">
+              <a:rPr lang="en-US" altLang="ko-KR" sz="2000" dirty="0"/>
+              <a:t>Movies</a:t>
+            </a:r>
+            <a:endParaRPr lang="ko-KR" altLang="en-US" sz="2000" dirty="0"/>
+          </a:p>
+        </p:txBody>
+      </p:sp>
+      <p:pic>
+        <p:nvPicPr>
+          <p:cNvPr id="5" name="그림 4">
+            <a:extLst>
+              <a:ext uri="{FF2B5EF4-FFF2-40B4-BE49-F238E27FC236}">
+                <a16:creationId xmlns:a16="http://schemas.microsoft.com/office/drawing/2014/main" id="{094AF442-DB1D-4B80-B501-1FB8039DCE63}"/>
+              </a:ext>
+            </a:extLst>
+          </p:cNvPr>
+          <p:cNvPicPr>
+            <a:picLocks noChangeAspect="1"/>
+          </p:cNvPicPr>
+          <p:nvPr/>
+        </p:nvPicPr>
+        <p:blipFill>
+          <a:blip r:embed="rId2"/>
+          <a:stretch>
+            <a:fillRect/>
+          </a:stretch>
+        </p:blipFill>
+        <p:spPr>
+          <a:xfrm>
+            <a:off x="1242029" y="1141887"/>
+            <a:ext cx="2353003" cy="2000529"/>
+          </a:xfrm>
+          <a:prstGeom prst="rect">
+            <a:avLst/>
+          </a:prstGeom>
+        </p:spPr>
+      </p:pic>
+      <p:pic>
+        <p:nvPicPr>
+          <p:cNvPr id="7" name="그림 6">
+            <a:extLst>
+              <a:ext uri="{FF2B5EF4-FFF2-40B4-BE49-F238E27FC236}">
+                <a16:creationId xmlns:a16="http://schemas.microsoft.com/office/drawing/2014/main" id="{A32738B1-518C-427E-8F9A-424C3D9CFF50}"/>
+              </a:ext>
+            </a:extLst>
+          </p:cNvPr>
+          <p:cNvPicPr>
+            <a:picLocks noChangeAspect="1"/>
+          </p:cNvPicPr>
+          <p:nvPr/>
+        </p:nvPicPr>
+        <p:blipFill>
+          <a:blip r:embed="rId3"/>
+          <a:stretch>
+            <a:fillRect/>
+          </a:stretch>
+        </p:blipFill>
+        <p:spPr>
+          <a:xfrm>
+            <a:off x="3950110" y="1141887"/>
+            <a:ext cx="3067478" cy="2562583"/>
+          </a:xfrm>
+          <a:prstGeom prst="rect">
+            <a:avLst/>
+          </a:prstGeom>
+        </p:spPr>
+      </p:pic>
+      <p:sp>
+        <p:nvSpPr>
+          <p:cNvPr id="8" name="제목 1">
+            <a:extLst>
+              <a:ext uri="{FF2B5EF4-FFF2-40B4-BE49-F238E27FC236}">
+                <a16:creationId xmlns:a16="http://schemas.microsoft.com/office/drawing/2014/main" id="{0AD79E46-BB66-4676-8CD1-BC5EB4339A2D}"/>
+              </a:ext>
+            </a:extLst>
+          </p:cNvPr>
+          <p:cNvSpPr txBox="1">
+            <a:spLocks/>
+          </p:cNvSpPr>
+          <p:nvPr/>
+        </p:nvSpPr>
+        <p:spPr>
+          <a:xfrm>
+            <a:off x="4581627" y="218539"/>
+            <a:ext cx="1518749" cy="923348"/>
+          </a:xfrm>
+          <a:prstGeom prst="rect">
+            <a:avLst/>
+          </a:prstGeom>
+        </p:spPr>
+        <p:txBody>
+          <a:bodyPr vert="horz" lIns="91440" tIns="45720" rIns="91440" bIns="45720" rtlCol="0" anchor="ctr">
+            <a:normAutofit/>
+          </a:bodyPr>
+          <a:lstStyle>
+            <a:lvl1pPr algn="l" defTabSz="914400" rtl="0" eaLnBrk="1" latinLnBrk="1" hangingPunct="1">
+              <a:lnSpc>
+                <a:spcPct val="90000"/>
+              </a:lnSpc>
+              <a:spcBef>
+                <a:spcPct val="0"/>
+              </a:spcBef>
+              <a:buNone/>
+              <a:defRPr sz="4400" kern="1200">
                 <a:solidFill>
-                  <a:srgbClr val="000000"/>
+                  <a:schemeClr val="tx1"/>
                 </a:solidFill>
-                <a:effectLst/>
-                <a:latin typeface="Noto Sans KR"/>
-              </a:rPr>
-              <a:t>https://grouplens.org/datasets/movielens/</a:t>
-            </a:r>
-            <a:endParaRPr lang="ko-KR" altLang="en-US" dirty="0"/>
+                <a:latin typeface="+mj-lt"/>
+                <a:ea typeface="+mj-ea"/>
+                <a:cs typeface="+mj-cs"/>
+              </a:defRPr>
+            </a:lvl1pPr>
+          </a:lstStyle>
+          <a:p>
+            <a:r>
+              <a:rPr lang="en-US" altLang="ko-KR" sz="2000" dirty="0"/>
+              <a:t>rating</a:t>
+            </a:r>
+            <a:endParaRPr lang="ko-KR" altLang="en-US" sz="2000" dirty="0"/>
+          </a:p>
+        </p:txBody>
+      </p:sp>
+      <p:pic>
+        <p:nvPicPr>
+          <p:cNvPr id="10" name="그림 9">
+            <a:extLst>
+              <a:ext uri="{FF2B5EF4-FFF2-40B4-BE49-F238E27FC236}">
+                <a16:creationId xmlns:a16="http://schemas.microsoft.com/office/drawing/2014/main" id="{D5EA775C-FB30-4216-AFC2-E97264283597}"/>
+              </a:ext>
+            </a:extLst>
+          </p:cNvPr>
+          <p:cNvPicPr>
+            <a:picLocks noChangeAspect="1"/>
+          </p:cNvPicPr>
+          <p:nvPr/>
+        </p:nvPicPr>
+        <p:blipFill>
+          <a:blip r:embed="rId4"/>
+          <a:stretch>
+            <a:fillRect/>
+          </a:stretch>
+        </p:blipFill>
+        <p:spPr>
+          <a:xfrm>
+            <a:off x="7470300" y="1141887"/>
+            <a:ext cx="3191320" cy="2191056"/>
+          </a:xfrm>
+          <a:prstGeom prst="rect">
+            <a:avLst/>
+          </a:prstGeom>
+        </p:spPr>
+      </p:pic>
+      <p:sp>
+        <p:nvSpPr>
+          <p:cNvPr id="11" name="제목 1">
+            <a:extLst>
+              <a:ext uri="{FF2B5EF4-FFF2-40B4-BE49-F238E27FC236}">
+                <a16:creationId xmlns:a16="http://schemas.microsoft.com/office/drawing/2014/main" id="{D0A83741-3FF1-4D16-8026-B6BB944AFF2F}"/>
+              </a:ext>
+            </a:extLst>
+          </p:cNvPr>
+          <p:cNvSpPr txBox="1">
+            <a:spLocks/>
+          </p:cNvSpPr>
+          <p:nvPr/>
+        </p:nvSpPr>
+        <p:spPr>
+          <a:xfrm>
+            <a:off x="7451399" y="254590"/>
+            <a:ext cx="1518749" cy="923348"/>
+          </a:xfrm>
+          <a:prstGeom prst="rect">
+            <a:avLst/>
+          </a:prstGeom>
+        </p:spPr>
+        <p:txBody>
+          <a:bodyPr vert="horz" lIns="91440" tIns="45720" rIns="91440" bIns="45720" rtlCol="0" anchor="ctr">
+            <a:normAutofit/>
+          </a:bodyPr>
+          <a:lstStyle>
+            <a:lvl1pPr algn="l" defTabSz="914400" rtl="0" eaLnBrk="1" latinLnBrk="1" hangingPunct="1">
+              <a:lnSpc>
+                <a:spcPct val="90000"/>
+              </a:lnSpc>
+              <a:spcBef>
+                <a:spcPct val="0"/>
+              </a:spcBef>
+              <a:buNone/>
+              <a:defRPr sz="4400" kern="1200">
+                <a:solidFill>
+                  <a:schemeClr val="tx1"/>
+                </a:solidFill>
+                <a:latin typeface="+mj-lt"/>
+                <a:ea typeface="+mj-ea"/>
+                <a:cs typeface="+mj-cs"/>
+              </a:defRPr>
+            </a:lvl1pPr>
+          </a:lstStyle>
+          <a:p>
+            <a:r>
+              <a:rPr lang="en-US" altLang="ko-KR" sz="2000" dirty="0"/>
+              <a:t>tag</a:t>
+            </a:r>
+            <a:endParaRPr lang="ko-KR" altLang="en-US" sz="2000" dirty="0"/>
+          </a:p>
+        </p:txBody>
+      </p:sp>
+      <p:pic>
+        <p:nvPicPr>
+          <p:cNvPr id="13" name="그림 12">
+            <a:extLst>
+              <a:ext uri="{FF2B5EF4-FFF2-40B4-BE49-F238E27FC236}">
+                <a16:creationId xmlns:a16="http://schemas.microsoft.com/office/drawing/2014/main" id="{30565D59-B7F0-490F-9935-D354068B597C}"/>
+              </a:ext>
+            </a:extLst>
+          </p:cNvPr>
+          <p:cNvPicPr>
+            <a:picLocks noChangeAspect="1"/>
+          </p:cNvPicPr>
+          <p:nvPr/>
+        </p:nvPicPr>
+        <p:blipFill>
+          <a:blip r:embed="rId5"/>
+          <a:stretch>
+            <a:fillRect/>
+          </a:stretch>
+        </p:blipFill>
+        <p:spPr>
+          <a:xfrm>
+            <a:off x="1108538" y="4221992"/>
+            <a:ext cx="1686160" cy="2305372"/>
+          </a:xfrm>
+          <a:prstGeom prst="rect">
+            <a:avLst/>
+          </a:prstGeom>
+        </p:spPr>
+      </p:pic>
+      <p:pic>
+        <p:nvPicPr>
+          <p:cNvPr id="15" name="그림 14">
+            <a:extLst>
+              <a:ext uri="{FF2B5EF4-FFF2-40B4-BE49-F238E27FC236}">
+                <a16:creationId xmlns:a16="http://schemas.microsoft.com/office/drawing/2014/main" id="{D15FE460-05EB-4B3C-B54F-80AC0DEDF56A}"/>
+              </a:ext>
+            </a:extLst>
+          </p:cNvPr>
+          <p:cNvPicPr>
+            <a:picLocks noChangeAspect="1"/>
+          </p:cNvPicPr>
+          <p:nvPr/>
+        </p:nvPicPr>
+        <p:blipFill>
+          <a:blip r:embed="rId6"/>
+          <a:stretch>
+            <a:fillRect/>
+          </a:stretch>
+        </p:blipFill>
+        <p:spPr>
+          <a:xfrm>
+            <a:off x="6578146" y="4507782"/>
+            <a:ext cx="2381582" cy="2019582"/>
+          </a:xfrm>
+          <a:prstGeom prst="rect">
+            <a:avLst/>
+          </a:prstGeom>
+        </p:spPr>
+      </p:pic>
+      <p:sp>
+        <p:nvSpPr>
+          <p:cNvPr id="16" name="제목 1">
+            <a:extLst>
+              <a:ext uri="{FF2B5EF4-FFF2-40B4-BE49-F238E27FC236}">
+                <a16:creationId xmlns:a16="http://schemas.microsoft.com/office/drawing/2014/main" id="{7583DC7C-CA45-416A-B73D-1D31A1571B9B}"/>
+              </a:ext>
+            </a:extLst>
+          </p:cNvPr>
+          <p:cNvSpPr txBox="1">
+            <a:spLocks/>
+          </p:cNvSpPr>
+          <p:nvPr/>
+        </p:nvSpPr>
+        <p:spPr>
+          <a:xfrm>
+            <a:off x="940693" y="3574338"/>
+            <a:ext cx="2021851" cy="923348"/>
+          </a:xfrm>
+          <a:prstGeom prst="rect">
+            <a:avLst/>
+          </a:prstGeom>
+        </p:spPr>
+        <p:txBody>
+          <a:bodyPr vert="horz" lIns="91440" tIns="45720" rIns="91440" bIns="45720" rtlCol="0" anchor="ctr">
+            <a:normAutofit/>
+          </a:bodyPr>
+          <a:lstStyle>
+            <a:lvl1pPr algn="l" defTabSz="914400" rtl="0" eaLnBrk="1" latinLnBrk="1" hangingPunct="1">
+              <a:lnSpc>
+                <a:spcPct val="90000"/>
+              </a:lnSpc>
+              <a:spcBef>
+                <a:spcPct val="0"/>
+              </a:spcBef>
+              <a:buNone/>
+              <a:defRPr sz="4400" kern="1200">
+                <a:solidFill>
+                  <a:schemeClr val="tx1"/>
+                </a:solidFill>
+                <a:latin typeface="+mj-lt"/>
+                <a:ea typeface="+mj-ea"/>
+                <a:cs typeface="+mj-cs"/>
+              </a:defRPr>
+            </a:lvl1pPr>
+          </a:lstStyle>
+          <a:p>
+            <a:r>
+              <a:rPr lang="en-US" altLang="ko-KR" sz="2000" dirty="0"/>
+              <a:t>genome-tags</a:t>
+            </a:r>
+            <a:endParaRPr lang="ko-KR" altLang="en-US" sz="2000" dirty="0"/>
+          </a:p>
+        </p:txBody>
+      </p:sp>
+      <p:sp>
+        <p:nvSpPr>
+          <p:cNvPr id="17" name="제목 1">
+            <a:extLst>
+              <a:ext uri="{FF2B5EF4-FFF2-40B4-BE49-F238E27FC236}">
+                <a16:creationId xmlns:a16="http://schemas.microsoft.com/office/drawing/2014/main" id="{8F19F47D-5427-454B-8CC1-87F3A1607FD3}"/>
+              </a:ext>
+            </a:extLst>
+          </p:cNvPr>
+          <p:cNvSpPr txBox="1">
+            <a:spLocks/>
+          </p:cNvSpPr>
+          <p:nvPr/>
+        </p:nvSpPr>
+        <p:spPr>
+          <a:xfrm>
+            <a:off x="6716252" y="3704470"/>
+            <a:ext cx="2124047" cy="923348"/>
+          </a:xfrm>
+          <a:prstGeom prst="rect">
+            <a:avLst/>
+          </a:prstGeom>
+        </p:spPr>
+        <p:txBody>
+          <a:bodyPr vert="horz" lIns="91440" tIns="45720" rIns="91440" bIns="45720" rtlCol="0" anchor="ctr">
+            <a:normAutofit/>
+          </a:bodyPr>
+          <a:lstStyle>
+            <a:lvl1pPr algn="l" defTabSz="914400" rtl="0" eaLnBrk="1" latinLnBrk="1" hangingPunct="1">
+              <a:lnSpc>
+                <a:spcPct val="90000"/>
+              </a:lnSpc>
+              <a:spcBef>
+                <a:spcPct val="0"/>
+              </a:spcBef>
+              <a:buNone/>
+              <a:defRPr sz="4400" kern="1200">
+                <a:solidFill>
+                  <a:schemeClr val="tx1"/>
+                </a:solidFill>
+                <a:latin typeface="+mj-lt"/>
+                <a:ea typeface="+mj-ea"/>
+                <a:cs typeface="+mj-cs"/>
+              </a:defRPr>
+            </a:lvl1pPr>
+          </a:lstStyle>
+          <a:p>
+            <a:r>
+              <a:rPr lang="en-US" altLang="ko-KR" sz="2000" dirty="0"/>
+              <a:t>genome-scores</a:t>
+            </a:r>
+            <a:endParaRPr lang="ko-KR" altLang="en-US" sz="2000" dirty="0"/>
+          </a:p>
+        </p:txBody>
+      </p:sp>
+      <p:sp>
+        <p:nvSpPr>
+          <p:cNvPr id="18" name="제목 1">
+            <a:extLst>
+              <a:ext uri="{FF2B5EF4-FFF2-40B4-BE49-F238E27FC236}">
+                <a16:creationId xmlns:a16="http://schemas.microsoft.com/office/drawing/2014/main" id="{6F80E19B-A609-40A8-843D-C0B3142153F6}"/>
+              </a:ext>
+            </a:extLst>
+          </p:cNvPr>
+          <p:cNvSpPr txBox="1">
+            <a:spLocks/>
+          </p:cNvSpPr>
+          <p:nvPr/>
+        </p:nvSpPr>
+        <p:spPr>
+          <a:xfrm>
+            <a:off x="9274894" y="4507781"/>
+            <a:ext cx="2331547" cy="1208331"/>
+          </a:xfrm>
+          <a:prstGeom prst="rect">
+            <a:avLst/>
+          </a:prstGeom>
+        </p:spPr>
+        <p:txBody>
+          <a:bodyPr vert="horz" lIns="91440" tIns="45720" rIns="91440" bIns="45720" rtlCol="0" anchor="ctr">
+            <a:normAutofit/>
+          </a:bodyPr>
+          <a:lstStyle>
+            <a:lvl1pPr algn="l" defTabSz="914400" rtl="0" eaLnBrk="1" latinLnBrk="1" hangingPunct="1">
+              <a:lnSpc>
+                <a:spcPct val="90000"/>
+              </a:lnSpc>
+              <a:spcBef>
+                <a:spcPct val="0"/>
+              </a:spcBef>
+              <a:buNone/>
+              <a:defRPr sz="4400" kern="1200">
+                <a:solidFill>
+                  <a:schemeClr val="tx1"/>
+                </a:solidFill>
+                <a:latin typeface="+mj-lt"/>
+                <a:ea typeface="+mj-ea"/>
+                <a:cs typeface="+mj-cs"/>
+              </a:defRPr>
+            </a:lvl1pPr>
+          </a:lstStyle>
+          <a:p>
+            <a:r>
+              <a:rPr lang="ko-KR" altLang="en-US" sz="2000" dirty="0"/>
+              <a:t>연관성 데이터를 사용해서 아이템기반 </a:t>
+            </a:r>
+            <a:r>
+              <a:rPr lang="ko-KR" altLang="en-US" sz="2000" dirty="0" err="1"/>
+              <a:t>협업필터링할때</a:t>
+            </a:r>
+            <a:r>
+              <a:rPr lang="ko-KR" altLang="en-US" sz="2000" dirty="0"/>
+              <a:t> 사용해도 되는지</a:t>
+            </a:r>
+            <a:r>
+              <a:rPr lang="en-US" altLang="ko-KR" sz="2000" dirty="0"/>
+              <a:t>??</a:t>
+            </a:r>
+            <a:endParaRPr lang="ko-KR" altLang="en-US" sz="2000" dirty="0"/>
           </a:p>
         </p:txBody>
       </p:sp>
     </p:spTree>
     <p:extLst>
       <p:ext uri="{BB962C8B-B14F-4D97-AF65-F5344CB8AC3E}">
-        <p14:creationId xmlns:p14="http://schemas.microsoft.com/office/powerpoint/2010/main" val="1401117775"/>
+        <p14:creationId xmlns:p14="http://schemas.microsoft.com/office/powerpoint/2010/main" val="4126689502"/>
+      </p:ext>
+    </p:extLst>
+  </p:cSld>
+  <p:clrMapOvr>
+    <a:masterClrMapping/>
+  </p:clrMapOvr>
+</p:sld>
+</file>
+
+<file path=ppt/slides/slide5.xml><?xml version="1.0" encoding="utf-8"?>
+<p:sld xmlns:a="http://schemas.openxmlformats.org/drawingml/2006/main" xmlns:r="http://schemas.openxmlformats.org/officeDocument/2006/relationships" xmlns:p="http://schemas.openxmlformats.org/presentationml/2006/main">
+  <p:cSld>
+    <p:bg>
+      <p:bgPr>
+        <a:solidFill>
+          <a:schemeClr val="bg1"/>
+        </a:solidFill>
+        <a:effectLst/>
+      </p:bgPr>
+    </p:bg>
+    <p:spTree>
+      <p:nvGrpSpPr>
+        <p:cNvPr id="1" name=""/>
+        <p:cNvGrpSpPr/>
+        <p:nvPr/>
+      </p:nvGrpSpPr>
+      <p:grpSpPr>
+        <a:xfrm>
+          <a:off x="0" y="0"/>
+          <a:ext cx="0" cy="0"/>
+          <a:chOff x="0" y="0"/>
+          <a:chExt cx="0" cy="0"/>
+        </a:xfrm>
+      </p:grpSpPr>
+      <p:sp>
+        <p:nvSpPr>
+          <p:cNvPr id="12" name="제목 1">
+            <a:extLst>
+              <a:ext uri="{FF2B5EF4-FFF2-40B4-BE49-F238E27FC236}">
+                <a16:creationId xmlns:a16="http://schemas.microsoft.com/office/drawing/2014/main" id="{059B3125-B858-4F61-8C63-1C213214D5EB}"/>
+              </a:ext>
+            </a:extLst>
+          </p:cNvPr>
+          <p:cNvSpPr txBox="1">
+            <a:spLocks/>
+          </p:cNvSpPr>
+          <p:nvPr/>
+        </p:nvSpPr>
+        <p:spPr>
+          <a:xfrm>
+            <a:off x="1440873" y="317019"/>
+            <a:ext cx="9144000" cy="1100720"/>
+          </a:xfrm>
+          <a:prstGeom prst="rect">
+            <a:avLst/>
+          </a:prstGeom>
+        </p:spPr>
+        <p:txBody>
+          <a:bodyPr vert="horz" lIns="91440" tIns="45720" rIns="91440" bIns="45720" rtlCol="0" anchor="ctr">
+            <a:normAutofit/>
+          </a:bodyPr>
+          <a:lstStyle>
+            <a:lvl1pPr algn="l" defTabSz="914400" rtl="0" eaLnBrk="1" latinLnBrk="1" hangingPunct="1">
+              <a:lnSpc>
+                <a:spcPct val="90000"/>
+              </a:lnSpc>
+              <a:spcBef>
+                <a:spcPct val="0"/>
+              </a:spcBef>
+              <a:buNone/>
+              <a:defRPr sz="4400" kern="1200">
+                <a:solidFill>
+                  <a:schemeClr val="tx1"/>
+                </a:solidFill>
+                <a:latin typeface="+mj-lt"/>
+                <a:ea typeface="+mj-ea"/>
+                <a:cs typeface="+mj-cs"/>
+              </a:defRPr>
+            </a:lvl1pPr>
+          </a:lstStyle>
+          <a:p>
+            <a:pPr algn="ctr"/>
+            <a:r>
+              <a:rPr lang="ko-KR" altLang="en-US" dirty="0"/>
+              <a:t>추천 모델 알고리즘 예시</a:t>
+            </a:r>
+          </a:p>
+        </p:txBody>
+      </p:sp>
+      <p:pic>
+        <p:nvPicPr>
+          <p:cNvPr id="3" name="그림 2">
+            <a:extLst>
+              <a:ext uri="{FF2B5EF4-FFF2-40B4-BE49-F238E27FC236}">
+                <a16:creationId xmlns:a16="http://schemas.microsoft.com/office/drawing/2014/main" id="{41CD001F-A207-4278-8D51-D6E93618D46A}"/>
+              </a:ext>
+            </a:extLst>
+          </p:cNvPr>
+          <p:cNvPicPr>
+            <a:picLocks noChangeAspect="1"/>
+          </p:cNvPicPr>
+          <p:nvPr/>
+        </p:nvPicPr>
+        <p:blipFill>
+          <a:blip r:embed="rId2"/>
+          <a:stretch>
+            <a:fillRect/>
+          </a:stretch>
+        </p:blipFill>
+        <p:spPr>
+          <a:xfrm>
+            <a:off x="8871469" y="2233164"/>
+            <a:ext cx="3070993" cy="3024514"/>
+          </a:xfrm>
+          <a:prstGeom prst="rect">
+            <a:avLst/>
+          </a:prstGeom>
+        </p:spPr>
+      </p:pic>
+      <p:pic>
+        <p:nvPicPr>
+          <p:cNvPr id="6" name="그림 5">
+            <a:extLst>
+              <a:ext uri="{FF2B5EF4-FFF2-40B4-BE49-F238E27FC236}">
+                <a16:creationId xmlns:a16="http://schemas.microsoft.com/office/drawing/2014/main" id="{A88FF7FB-E869-49DA-8671-58EB511C4348}"/>
+              </a:ext>
+            </a:extLst>
+          </p:cNvPr>
+          <p:cNvPicPr>
+            <a:picLocks noChangeAspect="1"/>
+          </p:cNvPicPr>
+          <p:nvPr/>
+        </p:nvPicPr>
+        <p:blipFill>
+          <a:blip r:embed="rId3"/>
+          <a:stretch>
+            <a:fillRect/>
+          </a:stretch>
+        </p:blipFill>
+        <p:spPr>
+          <a:xfrm>
+            <a:off x="5311923" y="2233164"/>
+            <a:ext cx="3070993" cy="3024514"/>
+          </a:xfrm>
+          <a:prstGeom prst="rect">
+            <a:avLst/>
+          </a:prstGeom>
+        </p:spPr>
+      </p:pic>
+      <p:pic>
+        <p:nvPicPr>
+          <p:cNvPr id="8" name="그림 7">
+            <a:extLst>
+              <a:ext uri="{FF2B5EF4-FFF2-40B4-BE49-F238E27FC236}">
+                <a16:creationId xmlns:a16="http://schemas.microsoft.com/office/drawing/2014/main" id="{46C2A6AE-FD51-441D-B9D0-42BE3716079E}"/>
+              </a:ext>
+            </a:extLst>
+          </p:cNvPr>
+          <p:cNvPicPr>
+            <a:picLocks noChangeAspect="1"/>
+          </p:cNvPicPr>
+          <p:nvPr/>
+        </p:nvPicPr>
+        <p:blipFill>
+          <a:blip r:embed="rId4"/>
+          <a:stretch>
+            <a:fillRect/>
+          </a:stretch>
+        </p:blipFill>
+        <p:spPr>
+          <a:xfrm>
+            <a:off x="1795" y="2219808"/>
+            <a:ext cx="5116185" cy="2912527"/>
+          </a:xfrm>
+          <a:prstGeom prst="rect">
+            <a:avLst/>
+          </a:prstGeom>
+        </p:spPr>
+      </p:pic>
+    </p:spTree>
+    <p:extLst>
+      <p:ext uri="{BB962C8B-B14F-4D97-AF65-F5344CB8AC3E}">
+        <p14:creationId xmlns:p14="http://schemas.microsoft.com/office/powerpoint/2010/main" val="1142723946"/>
+      </p:ext>
+    </p:extLst>
+  </p:cSld>
+  <p:clrMapOvr>
+    <a:masterClrMapping/>
+  </p:clrMapOvr>
+</p:sld>
+</file>
+
+<file path=ppt/slides/slide6.xml><?xml version="1.0" encoding="utf-8"?>
+<p:sld xmlns:a="http://schemas.openxmlformats.org/drawingml/2006/main" xmlns:r="http://schemas.openxmlformats.org/officeDocument/2006/relationships" xmlns:p="http://schemas.openxmlformats.org/presentationml/2006/main">
+  <p:cSld>
+    <p:spTree>
+      <p:nvGrpSpPr>
+        <p:cNvPr id="1" name=""/>
+        <p:cNvGrpSpPr/>
+        <p:nvPr/>
+      </p:nvGrpSpPr>
+      <p:grpSpPr>
+        <a:xfrm>
+          <a:off x="0" y="0"/>
+          <a:ext cx="0" cy="0"/>
+          <a:chOff x="0" y="0"/>
+          <a:chExt cx="0" cy="0"/>
+        </a:xfrm>
+      </p:grpSpPr>
+      <p:sp>
+        <p:nvSpPr>
+          <p:cNvPr id="2" name="제목 1">
+            <a:extLst>
+              <a:ext uri="{FF2B5EF4-FFF2-40B4-BE49-F238E27FC236}">
+                <a16:creationId xmlns:a16="http://schemas.microsoft.com/office/drawing/2014/main" id="{A442B8EB-99F7-47BD-B3CC-A55F92044458}"/>
+              </a:ext>
+            </a:extLst>
+          </p:cNvPr>
+          <p:cNvSpPr>
+            <a:spLocks noGrp="1"/>
+          </p:cNvSpPr>
+          <p:nvPr>
+            <p:ph type="title"/>
+          </p:nvPr>
+        </p:nvSpPr>
+        <p:spPr/>
+        <p:txBody>
+          <a:bodyPr/>
+          <a:lstStyle/>
+          <a:p>
+            <a:r>
+              <a:rPr lang="ko-KR" altLang="en-US" dirty="0"/>
+              <a:t>더 추가할 콘텐츠 사항들</a:t>
+            </a:r>
+            <a:r>
+              <a:rPr lang="en-US" altLang="ko-KR" dirty="0"/>
+              <a:t>..</a:t>
+            </a:r>
+            <a:endParaRPr lang="ko-KR" altLang="en-US" dirty="0"/>
+          </a:p>
+        </p:txBody>
+      </p:sp>
+      <p:sp>
+        <p:nvSpPr>
+          <p:cNvPr id="3" name="내용 개체 틀 2">
+            <a:extLst>
+              <a:ext uri="{FF2B5EF4-FFF2-40B4-BE49-F238E27FC236}">
+                <a16:creationId xmlns:a16="http://schemas.microsoft.com/office/drawing/2014/main" id="{B36740EF-D600-4C42-8928-74F796E5AC29}"/>
+              </a:ext>
+            </a:extLst>
+          </p:cNvPr>
+          <p:cNvSpPr>
+            <a:spLocks noGrp="1"/>
+          </p:cNvSpPr>
+          <p:nvPr>
+            <p:ph idx="1"/>
+          </p:nvPr>
+        </p:nvSpPr>
+        <p:spPr/>
+        <p:txBody>
+          <a:bodyPr>
+            <a:normAutofit fontScale="92500" lnSpcReduction="20000"/>
+          </a:bodyPr>
+          <a:lstStyle/>
+          <a:p>
+            <a:pPr marL="0" indent="0">
+              <a:buNone/>
+            </a:pPr>
+            <a:r>
+              <a:rPr lang="ko-KR" altLang="en-US" dirty="0"/>
+              <a:t>평점 순으로 영화 추천</a:t>
+            </a:r>
+            <a:endParaRPr lang="en-US" altLang="ko-KR" dirty="0"/>
+          </a:p>
+          <a:p>
+            <a:pPr marL="0" indent="0">
+              <a:buNone/>
+            </a:pPr>
+            <a:r>
+              <a:rPr lang="ko-KR" altLang="en-US" dirty="0"/>
+              <a:t>장르별 영화 추천</a:t>
+            </a:r>
+            <a:endParaRPr lang="en-US" altLang="ko-KR" dirty="0"/>
+          </a:p>
+          <a:p>
+            <a:pPr marL="0" indent="0">
+              <a:buNone/>
+            </a:pPr>
+            <a:endParaRPr lang="en-US" altLang="ko-KR" dirty="0"/>
+          </a:p>
+          <a:p>
+            <a:pPr marL="0" indent="0">
+              <a:buNone/>
+            </a:pPr>
+            <a:r>
+              <a:rPr lang="en-US" altLang="ko-KR" dirty="0"/>
+              <a:t># </a:t>
+            </a:r>
+            <a:r>
+              <a:rPr lang="ko-KR" altLang="en-US" dirty="0"/>
+              <a:t>계절에 따른 영화 추천</a:t>
+            </a:r>
+            <a:endParaRPr lang="en-US" altLang="ko-KR" dirty="0"/>
+          </a:p>
+          <a:p>
+            <a:pPr marL="0" indent="0">
+              <a:buNone/>
+            </a:pPr>
+            <a:r>
+              <a:rPr lang="en-US" altLang="ko-KR" dirty="0"/>
+              <a:t># SNS </a:t>
+            </a:r>
+            <a:r>
+              <a:rPr lang="ko-KR" altLang="en-US" dirty="0"/>
+              <a:t>해시태그 추출</a:t>
+            </a:r>
+            <a:r>
+              <a:rPr lang="en-US" altLang="ko-KR" dirty="0"/>
+              <a:t> (</a:t>
+            </a:r>
+            <a:r>
+              <a:rPr lang="ko-KR" altLang="en-US" dirty="0"/>
+              <a:t>감정분석</a:t>
+            </a:r>
+            <a:r>
+              <a:rPr lang="en-US" altLang="ko-KR" dirty="0"/>
+              <a:t>)-&gt; </a:t>
+            </a:r>
+            <a:r>
+              <a:rPr lang="ko-KR" altLang="en-US" dirty="0"/>
+              <a:t>일치도가 높으면 추천</a:t>
+            </a:r>
+            <a:r>
+              <a:rPr lang="en-US" altLang="ko-KR" dirty="0"/>
+              <a:t>?</a:t>
+            </a:r>
+          </a:p>
+          <a:p>
+            <a:pPr marL="0" indent="0">
+              <a:buNone/>
+            </a:pPr>
+            <a:r>
+              <a:rPr lang="en-US" altLang="ko-KR" dirty="0"/>
+              <a:t># </a:t>
+            </a:r>
+            <a:r>
+              <a:rPr lang="ko-KR" altLang="en-US" dirty="0"/>
+              <a:t>관심있는 배우</a:t>
+            </a:r>
+            <a:r>
+              <a:rPr lang="en-US" altLang="ko-KR" dirty="0"/>
+              <a:t>/</a:t>
+            </a:r>
+            <a:r>
+              <a:rPr lang="ko-KR" altLang="en-US" dirty="0"/>
+              <a:t>감독의 작품추천</a:t>
+            </a:r>
+            <a:r>
+              <a:rPr lang="en-US" altLang="ko-KR" dirty="0"/>
+              <a:t>??</a:t>
+            </a:r>
+          </a:p>
+          <a:p>
+            <a:pPr marL="0" indent="0">
+              <a:buNone/>
+            </a:pPr>
+            <a:r>
+              <a:rPr lang="en-US" altLang="ko-KR" dirty="0"/>
+              <a:t># </a:t>
+            </a:r>
+            <a:r>
+              <a:rPr lang="ko-KR" altLang="en-US" dirty="0"/>
+              <a:t>영화 태그와 스포티파이 음악 태그와 일치 또는 유사한 추천</a:t>
+            </a:r>
+            <a:r>
+              <a:rPr lang="en-US" altLang="ko-KR" dirty="0"/>
+              <a:t>.</a:t>
+            </a:r>
+          </a:p>
+          <a:p>
+            <a:pPr marL="0" indent="0">
+              <a:buNone/>
+            </a:pPr>
+            <a:r>
+              <a:rPr lang="en-US" altLang="ko-KR" dirty="0"/>
+              <a:t># </a:t>
+            </a:r>
+            <a:r>
+              <a:rPr lang="ko-KR" altLang="en-US" dirty="0"/>
+              <a:t>관람객 평점과 전문가 평점의 차이 큰 영화</a:t>
+            </a:r>
+            <a:r>
+              <a:rPr lang="en-US" altLang="ko-KR" dirty="0"/>
+              <a:t>?</a:t>
+            </a:r>
+          </a:p>
+          <a:p>
+            <a:pPr marL="0" indent="0">
+              <a:buNone/>
+            </a:pPr>
+            <a:endParaRPr lang="en-US" altLang="ko-KR" dirty="0"/>
+          </a:p>
+          <a:p>
+            <a:pPr marL="0" indent="0">
+              <a:buNone/>
+            </a:pPr>
+            <a:r>
+              <a:rPr lang="ko-KR" altLang="en-US" dirty="0"/>
+              <a:t>기타 등등</a:t>
+            </a:r>
+            <a:r>
+              <a:rPr lang="en-US" altLang="ko-KR" dirty="0"/>
+              <a:t>..</a:t>
+            </a:r>
+          </a:p>
+          <a:p>
+            <a:pPr marL="0" indent="0">
+              <a:buNone/>
+            </a:pPr>
+            <a:endParaRPr lang="en-US" altLang="ko-KR" dirty="0"/>
+          </a:p>
+        </p:txBody>
+      </p:sp>
+    </p:spTree>
+    <p:extLst>
+      <p:ext uri="{BB962C8B-B14F-4D97-AF65-F5344CB8AC3E}">
+        <p14:creationId xmlns:p14="http://schemas.microsoft.com/office/powerpoint/2010/main" val="1063618740"/>
+      </p:ext>
+    </p:extLst>
+  </p:cSld>
+  <p:clrMapOvr>
+    <a:masterClrMapping/>
+  </p:clrMapOvr>
+</p:sld>
+</file>
+
+<file path=ppt/slides/slide7.xml><?xml version="1.0" encoding="utf-8"?>
+<p:sld xmlns:a="http://schemas.openxmlformats.org/drawingml/2006/main" xmlns:r="http://schemas.openxmlformats.org/officeDocument/2006/relationships" xmlns:p="http://schemas.openxmlformats.org/presentationml/2006/main">
+  <p:cSld>
+    <p:spTree>
+      <p:nvGrpSpPr>
+        <p:cNvPr id="1" name=""/>
+        <p:cNvGrpSpPr/>
+        <p:nvPr/>
+      </p:nvGrpSpPr>
+      <p:grpSpPr>
+        <a:xfrm>
+          <a:off x="0" y="0"/>
+          <a:ext cx="0" cy="0"/>
+          <a:chOff x="0" y="0"/>
+          <a:chExt cx="0" cy="0"/>
+        </a:xfrm>
+      </p:grpSpPr>
+      <p:sp>
+        <p:nvSpPr>
+          <p:cNvPr id="2" name="제목 1">
+            <a:extLst>
+              <a:ext uri="{FF2B5EF4-FFF2-40B4-BE49-F238E27FC236}">
+                <a16:creationId xmlns:a16="http://schemas.microsoft.com/office/drawing/2014/main" id="{6CC21013-FCDD-4A59-8312-8C85FB0347A4}"/>
+              </a:ext>
+            </a:extLst>
+          </p:cNvPr>
+          <p:cNvSpPr>
+            <a:spLocks noGrp="1"/>
+          </p:cNvSpPr>
+          <p:nvPr>
+            <p:ph type="title"/>
+          </p:nvPr>
+        </p:nvSpPr>
+        <p:spPr/>
+        <p:txBody>
+          <a:bodyPr/>
+          <a:lstStyle/>
+          <a:p>
+            <a:r>
+              <a:rPr lang="ko-KR" altLang="en-US" dirty="0"/>
+              <a:t>예상되는 결과물</a:t>
+            </a:r>
+          </a:p>
+        </p:txBody>
+      </p:sp>
+      <p:pic>
+        <p:nvPicPr>
+          <p:cNvPr id="5" name="내용 개체 틀 4">
+            <a:extLst>
+              <a:ext uri="{FF2B5EF4-FFF2-40B4-BE49-F238E27FC236}">
+                <a16:creationId xmlns:a16="http://schemas.microsoft.com/office/drawing/2014/main" id="{461F6014-821B-43D1-82C7-EE6F1C827D48}"/>
+              </a:ext>
+            </a:extLst>
+          </p:cNvPr>
+          <p:cNvPicPr>
+            <a:picLocks noGrp="1" noChangeAspect="1"/>
+          </p:cNvPicPr>
+          <p:nvPr>
+            <p:ph idx="1"/>
+          </p:nvPr>
+        </p:nvPicPr>
+        <p:blipFill>
+          <a:blip r:embed="rId2"/>
+          <a:stretch>
+            <a:fillRect/>
+          </a:stretch>
+        </p:blipFill>
+        <p:spPr>
+          <a:xfrm>
+            <a:off x="838200" y="1818508"/>
+            <a:ext cx="4277592" cy="3762900"/>
+          </a:xfrm>
+        </p:spPr>
+      </p:pic>
+      <p:pic>
+        <p:nvPicPr>
+          <p:cNvPr id="7" name="그림 6">
+            <a:extLst>
+              <a:ext uri="{FF2B5EF4-FFF2-40B4-BE49-F238E27FC236}">
+                <a16:creationId xmlns:a16="http://schemas.microsoft.com/office/drawing/2014/main" id="{5751F315-8AF8-4974-8090-001FCF708B3B}"/>
+              </a:ext>
+            </a:extLst>
+          </p:cNvPr>
+          <p:cNvPicPr>
+            <a:picLocks noChangeAspect="1"/>
+          </p:cNvPicPr>
+          <p:nvPr/>
+        </p:nvPicPr>
+        <p:blipFill>
+          <a:blip r:embed="rId3"/>
+          <a:stretch>
+            <a:fillRect/>
+          </a:stretch>
+        </p:blipFill>
+        <p:spPr>
+          <a:xfrm>
+            <a:off x="6095999" y="2004515"/>
+            <a:ext cx="5464447" cy="3576893"/>
+          </a:xfrm>
+          <a:prstGeom prst="rect">
+            <a:avLst/>
+          </a:prstGeom>
+        </p:spPr>
+      </p:pic>
+    </p:spTree>
+    <p:extLst>
+      <p:ext uri="{BB962C8B-B14F-4D97-AF65-F5344CB8AC3E}">
+        <p14:creationId xmlns:p14="http://schemas.microsoft.com/office/powerpoint/2010/main" val="1937262201"/>
       </p:ext>
     </p:extLst>
   </p:cSld>

</xml_diff>

<commit_message>
2021년 10월  9일 토 오후  6:14:18
</commit_message>
<xml_diff>
--- a/project/3) 파이널 프로젝트/다양한 추천 알고리즘을 활용한 영화 추천 시스템.pptx
+++ b/project/3) 파이널 프로젝트/다양한 추천 알고리즘을 활용한 영화 추천 시스템.pptx
@@ -265,7 +265,7 @@
           <a:p>
             <a:fld id="{82F01886-E80E-432B-9696-E511B938F199}" type="datetimeFigureOut">
               <a:rPr lang="ko-KR" altLang="en-US" smtClean="0"/>
-              <a:t>2021-10-08</a:t>
+              <a:t>2021-10-09</a:t>
             </a:fld>
             <a:endParaRPr lang="ko-KR" altLang="en-US"/>
           </a:p>
@@ -463,7 +463,7 @@
           <a:p>
             <a:fld id="{82F01886-E80E-432B-9696-E511B938F199}" type="datetimeFigureOut">
               <a:rPr lang="ko-KR" altLang="en-US" smtClean="0"/>
-              <a:t>2021-10-08</a:t>
+              <a:t>2021-10-09</a:t>
             </a:fld>
             <a:endParaRPr lang="ko-KR" altLang="en-US"/>
           </a:p>
@@ -671,7 +671,7 @@
           <a:p>
             <a:fld id="{82F01886-E80E-432B-9696-E511B938F199}" type="datetimeFigureOut">
               <a:rPr lang="ko-KR" altLang="en-US" smtClean="0"/>
-              <a:t>2021-10-08</a:t>
+              <a:t>2021-10-09</a:t>
             </a:fld>
             <a:endParaRPr lang="ko-KR" altLang="en-US"/>
           </a:p>
@@ -869,7 +869,7 @@
           <a:p>
             <a:fld id="{82F01886-E80E-432B-9696-E511B938F199}" type="datetimeFigureOut">
               <a:rPr lang="ko-KR" altLang="en-US" smtClean="0"/>
-              <a:t>2021-10-08</a:t>
+              <a:t>2021-10-09</a:t>
             </a:fld>
             <a:endParaRPr lang="ko-KR" altLang="en-US"/>
           </a:p>
@@ -1144,7 +1144,7 @@
           <a:p>
             <a:fld id="{82F01886-E80E-432B-9696-E511B938F199}" type="datetimeFigureOut">
               <a:rPr lang="ko-KR" altLang="en-US" smtClean="0"/>
-              <a:t>2021-10-08</a:t>
+              <a:t>2021-10-09</a:t>
             </a:fld>
             <a:endParaRPr lang="ko-KR" altLang="en-US"/>
           </a:p>
@@ -1409,7 +1409,7 @@
           <a:p>
             <a:fld id="{82F01886-E80E-432B-9696-E511B938F199}" type="datetimeFigureOut">
               <a:rPr lang="ko-KR" altLang="en-US" smtClean="0"/>
-              <a:t>2021-10-08</a:t>
+              <a:t>2021-10-09</a:t>
             </a:fld>
             <a:endParaRPr lang="ko-KR" altLang="en-US"/>
           </a:p>
@@ -1821,7 +1821,7 @@
           <a:p>
             <a:fld id="{82F01886-E80E-432B-9696-E511B938F199}" type="datetimeFigureOut">
               <a:rPr lang="ko-KR" altLang="en-US" smtClean="0"/>
-              <a:t>2021-10-08</a:t>
+              <a:t>2021-10-09</a:t>
             </a:fld>
             <a:endParaRPr lang="ko-KR" altLang="en-US"/>
           </a:p>
@@ -1962,7 +1962,7 @@
           <a:p>
             <a:fld id="{82F01886-E80E-432B-9696-E511B938F199}" type="datetimeFigureOut">
               <a:rPr lang="ko-KR" altLang="en-US" smtClean="0"/>
-              <a:t>2021-10-08</a:t>
+              <a:t>2021-10-09</a:t>
             </a:fld>
             <a:endParaRPr lang="ko-KR" altLang="en-US"/>
           </a:p>
@@ -2075,7 +2075,7 @@
           <a:p>
             <a:fld id="{82F01886-E80E-432B-9696-E511B938F199}" type="datetimeFigureOut">
               <a:rPr lang="ko-KR" altLang="en-US" smtClean="0"/>
-              <a:t>2021-10-08</a:t>
+              <a:t>2021-10-09</a:t>
             </a:fld>
             <a:endParaRPr lang="ko-KR" altLang="en-US"/>
           </a:p>
@@ -2386,7 +2386,7 @@
           <a:p>
             <a:fld id="{82F01886-E80E-432B-9696-E511B938F199}" type="datetimeFigureOut">
               <a:rPr lang="ko-KR" altLang="en-US" smtClean="0"/>
-              <a:t>2021-10-08</a:t>
+              <a:t>2021-10-09</a:t>
             </a:fld>
             <a:endParaRPr lang="ko-KR" altLang="en-US"/>
           </a:p>
@@ -2674,7 +2674,7 @@
           <a:p>
             <a:fld id="{82F01886-E80E-432B-9696-E511B938F199}" type="datetimeFigureOut">
               <a:rPr lang="ko-KR" altLang="en-US" smtClean="0"/>
-              <a:t>2021-10-08</a:t>
+              <a:t>2021-10-09</a:t>
             </a:fld>
             <a:endParaRPr lang="ko-KR" altLang="en-US"/>
           </a:p>
@@ -2915,7 +2915,7 @@
           <a:p>
             <a:fld id="{82F01886-E80E-432B-9696-E511B938F199}" type="datetimeFigureOut">
               <a:rPr lang="ko-KR" altLang="en-US" smtClean="0"/>
-              <a:t>2021-10-08</a:t>
+              <a:t>2021-10-09</a:t>
             </a:fld>
             <a:endParaRPr lang="ko-KR" altLang="en-US"/>
           </a:p>
@@ -3355,7 +3355,7 @@
           <a:p>
             <a:r>
               <a:rPr lang="ko-KR" altLang="en-US" dirty="0"/>
-              <a:t>다양한 추천 알고리즘을 활용한 영화 추천 시스템</a:t>
+              <a:t>다양한 추천 알고리즘을 활용한 영화 추천 서비스</a:t>
             </a:r>
           </a:p>
         </p:txBody>
@@ -4093,73 +4093,6 @@
             <a:r>
               <a:rPr lang="en-US" altLang="ko-KR" sz="2000" dirty="0"/>
               <a:t>genome-scores</a:t>
-            </a:r>
-            <a:endParaRPr lang="ko-KR" altLang="en-US" sz="2000" dirty="0"/>
-          </a:p>
-        </p:txBody>
-      </p:sp>
-      <p:sp>
-        <p:nvSpPr>
-          <p:cNvPr id="18" name="제목 1">
-            <a:extLst>
-              <a:ext uri="{FF2B5EF4-FFF2-40B4-BE49-F238E27FC236}">
-                <a16:creationId xmlns:a16="http://schemas.microsoft.com/office/drawing/2014/main" id="{6F80E19B-A609-40A8-843D-C0B3142153F6}"/>
-              </a:ext>
-            </a:extLst>
-          </p:cNvPr>
-          <p:cNvSpPr txBox="1">
-            <a:spLocks/>
-          </p:cNvSpPr>
-          <p:nvPr/>
-        </p:nvSpPr>
-        <p:spPr>
-          <a:xfrm>
-            <a:off x="9274894" y="4507781"/>
-            <a:ext cx="2331547" cy="1208331"/>
-          </a:xfrm>
-          <a:prstGeom prst="rect">
-            <a:avLst/>
-          </a:prstGeom>
-        </p:spPr>
-        <p:txBody>
-          <a:bodyPr vert="horz" lIns="91440" tIns="45720" rIns="91440" bIns="45720" rtlCol="0" anchor="ctr">
-            <a:normAutofit/>
-          </a:bodyPr>
-          <a:lstStyle>
-            <a:lvl1pPr algn="l" defTabSz="914400" rtl="0" eaLnBrk="1" latinLnBrk="1" hangingPunct="1">
-              <a:lnSpc>
-                <a:spcPct val="90000"/>
-              </a:lnSpc>
-              <a:spcBef>
-                <a:spcPct val="0"/>
-              </a:spcBef>
-              <a:buNone/>
-              <a:defRPr sz="4400" kern="1200">
-                <a:solidFill>
-                  <a:schemeClr val="tx1"/>
-                </a:solidFill>
-                <a:latin typeface="+mj-lt"/>
-                <a:ea typeface="+mj-ea"/>
-                <a:cs typeface="+mj-cs"/>
-              </a:defRPr>
-            </a:lvl1pPr>
-          </a:lstStyle>
-          <a:p>
-            <a:r>
-              <a:rPr lang="ko-KR" altLang="en-US" sz="2000" dirty="0"/>
-              <a:t>연관성 데이터를 사용해서 아이템기반 </a:t>
-            </a:r>
-            <a:r>
-              <a:rPr lang="ko-KR" altLang="en-US" sz="2000" dirty="0" err="1"/>
-              <a:t>협업필터링할때</a:t>
-            </a:r>
-            <a:r>
-              <a:rPr lang="ko-KR" altLang="en-US" sz="2000" dirty="0"/>
-              <a:t> 사용해도 되는지</a:t>
-            </a:r>
-            <a:r>
-              <a:rPr lang="en-US" altLang="ko-KR" sz="2000" dirty="0"/>
-              <a:t>??</a:t>
             </a:r>
             <a:endParaRPr lang="ko-KR" altLang="en-US" sz="2000" dirty="0"/>
           </a:p>
@@ -4430,9 +4363,19 @@
         <p:spPr/>
         <p:txBody>
           <a:bodyPr>
-            <a:normAutofit fontScale="92500" lnSpcReduction="20000"/>
+            <a:normAutofit fontScale="85000" lnSpcReduction="20000"/>
           </a:bodyPr>
           <a:lstStyle/>
+          <a:p>
+            <a:pPr marL="0" indent="0">
+              <a:buNone/>
+            </a:pPr>
+            <a:r>
+              <a:rPr lang="ko-KR" altLang="en-US" dirty="0"/>
+              <a:t>취향에 맞는 영화 추천</a:t>
+            </a:r>
+            <a:endParaRPr lang="en-US" altLang="ko-KR" dirty="0"/>
+          </a:p>
           <a:p>
             <a:pPr marL="0" indent="0">
               <a:buNone/>
@@ -4469,6 +4412,23 @@
             </a:r>
             <a:r>
               <a:rPr lang="ko-KR" altLang="en-US" dirty="0"/>
+              <a:t>영화 태그와 스포티파이 음악 태그와 일치 또는 유사한 추천</a:t>
+            </a:r>
+            <a:r>
+              <a:rPr lang="en-US" altLang="ko-KR" dirty="0"/>
+              <a:t>.</a:t>
+            </a:r>
+          </a:p>
+          <a:p>
+            <a:pPr marL="0" indent="0">
+              <a:buNone/>
+            </a:pPr>
+            <a:r>
+              <a:rPr lang="en-US" altLang="ko-KR" dirty="0"/>
+              <a:t># </a:t>
+            </a:r>
+            <a:r>
+              <a:rPr lang="ko-KR" altLang="en-US" dirty="0"/>
               <a:t>계절에 따른 영화 추천</a:t>
             </a:r>
             <a:endParaRPr lang="en-US" altLang="ko-KR" dirty="0"/>
@@ -4529,23 +4489,6 @@
             <a:r>
               <a:rPr lang="en-US" altLang="ko-KR" dirty="0"/>
               <a:t>??</a:t>
-            </a:r>
-          </a:p>
-          <a:p>
-            <a:pPr marL="0" indent="0">
-              <a:buNone/>
-            </a:pPr>
-            <a:r>
-              <a:rPr lang="en-US" altLang="ko-KR" dirty="0"/>
-              <a:t># </a:t>
-            </a:r>
-            <a:r>
-              <a:rPr lang="ko-KR" altLang="en-US" dirty="0"/>
-              <a:t>영화 태그와 스포티파이 음악 태그와 일치 또는 유사한 추천</a:t>
-            </a:r>
-            <a:r>
-              <a:rPr lang="en-US" altLang="ko-KR" dirty="0"/>
-              <a:t>.</a:t>
             </a:r>
           </a:p>
           <a:p>

</xml_diff>

<commit_message>
2021년 10월 11일 월 오전  9:36:59
</commit_message>
<xml_diff>
--- a/project/3) 파이널 프로젝트/다양한 추천 알고리즘을 활용한 영화 추천 시스템.pptx
+++ b/project/3) 파이널 프로젝트/다양한 추천 알고리즘을 활용한 영화 추천 시스템.pptx
@@ -9,9 +9,10 @@
     <p:sldId id="257" r:id="rId3"/>
     <p:sldId id="258" r:id="rId4"/>
     <p:sldId id="260" r:id="rId5"/>
-    <p:sldId id="259" r:id="rId6"/>
-    <p:sldId id="261" r:id="rId7"/>
-    <p:sldId id="262" r:id="rId8"/>
+    <p:sldId id="263" r:id="rId6"/>
+    <p:sldId id="259" r:id="rId7"/>
+    <p:sldId id="261" r:id="rId8"/>
+    <p:sldId id="262" r:id="rId9"/>
   </p:sldIdLst>
   <p:sldSz cx="12192000" cy="6858000"/>
   <p:notesSz cx="6858000" cy="9144000"/>
@@ -3350,13 +3351,28 @@
         </p:nvSpPr>
         <p:spPr/>
         <p:txBody>
-          <a:bodyPr/>
-          <a:lstStyle/>
-          <a:p>
-            <a:r>
-              <a:rPr lang="ko-KR" altLang="en-US" dirty="0"/>
+          <a:bodyPr>
+            <a:normAutofit/>
+          </a:bodyPr>
+          <a:lstStyle/>
+          <a:p>
+            <a:r>
+              <a:rPr lang="ko-KR" altLang="en-US" sz="5000" dirty="0"/>
               <a:t>다양한 추천 알고리즘을 활용한 영화 추천 시스템</a:t>
             </a:r>
+            <a:r>
+              <a:rPr lang="en-US" altLang="ko-KR" sz="5000" dirty="0"/>
+              <a:t>(</a:t>
+            </a:r>
+            <a:r>
+              <a:rPr lang="ko-KR" altLang="en-US" sz="5000" dirty="0"/>
+              <a:t>가제</a:t>
+            </a:r>
+            <a:r>
+              <a:rPr lang="en-US" altLang="ko-KR" sz="5000" dirty="0"/>
+              <a:t>)</a:t>
+            </a:r>
+            <a:endParaRPr lang="ko-KR" altLang="en-US" sz="5000" dirty="0"/>
           </a:p>
         </p:txBody>
       </p:sp>
@@ -4098,73 +4114,6 @@
           </a:p>
         </p:txBody>
       </p:sp>
-      <p:sp>
-        <p:nvSpPr>
-          <p:cNvPr id="18" name="제목 1">
-            <a:extLst>
-              <a:ext uri="{FF2B5EF4-FFF2-40B4-BE49-F238E27FC236}">
-                <a16:creationId xmlns:a16="http://schemas.microsoft.com/office/drawing/2014/main" id="{6F80E19B-A609-40A8-843D-C0B3142153F6}"/>
-              </a:ext>
-            </a:extLst>
-          </p:cNvPr>
-          <p:cNvSpPr txBox="1">
-            <a:spLocks/>
-          </p:cNvSpPr>
-          <p:nvPr/>
-        </p:nvSpPr>
-        <p:spPr>
-          <a:xfrm>
-            <a:off x="9274894" y="4507781"/>
-            <a:ext cx="2331547" cy="1208331"/>
-          </a:xfrm>
-          <a:prstGeom prst="rect">
-            <a:avLst/>
-          </a:prstGeom>
-        </p:spPr>
-        <p:txBody>
-          <a:bodyPr vert="horz" lIns="91440" tIns="45720" rIns="91440" bIns="45720" rtlCol="0" anchor="ctr">
-            <a:normAutofit/>
-          </a:bodyPr>
-          <a:lstStyle>
-            <a:lvl1pPr algn="l" defTabSz="914400" rtl="0" eaLnBrk="1" latinLnBrk="1" hangingPunct="1">
-              <a:lnSpc>
-                <a:spcPct val="90000"/>
-              </a:lnSpc>
-              <a:spcBef>
-                <a:spcPct val="0"/>
-              </a:spcBef>
-              <a:buNone/>
-              <a:defRPr sz="4400" kern="1200">
-                <a:solidFill>
-                  <a:schemeClr val="tx1"/>
-                </a:solidFill>
-                <a:latin typeface="+mj-lt"/>
-                <a:ea typeface="+mj-ea"/>
-                <a:cs typeface="+mj-cs"/>
-              </a:defRPr>
-            </a:lvl1pPr>
-          </a:lstStyle>
-          <a:p>
-            <a:r>
-              <a:rPr lang="ko-KR" altLang="en-US" sz="2000" dirty="0"/>
-              <a:t>연관성 데이터를 사용해서 아이템기반 </a:t>
-            </a:r>
-            <a:r>
-              <a:rPr lang="ko-KR" altLang="en-US" sz="2000" dirty="0" err="1"/>
-              <a:t>협업필터링할때</a:t>
-            </a:r>
-            <a:r>
-              <a:rPr lang="ko-KR" altLang="en-US" sz="2000" dirty="0"/>
-              <a:t> 사용해도 되는지</a:t>
-            </a:r>
-            <a:r>
-              <a:rPr lang="en-US" altLang="ko-KR" sz="2000" dirty="0"/>
-              <a:t>??</a:t>
-            </a:r>
-            <a:endParaRPr lang="ko-KR" altLang="en-US" sz="2000" dirty="0"/>
-          </a:p>
-        </p:txBody>
-      </p:sp>
     </p:spTree>
     <p:extLst>
       <p:ext uri="{BB962C8B-B14F-4D97-AF65-F5344CB8AC3E}">
@@ -4179,6 +4128,66 @@
 </file>
 
 <file path=ppt/slides/slide5.xml><?xml version="1.0" encoding="utf-8"?>
+<p:sld xmlns:a="http://schemas.openxmlformats.org/drawingml/2006/main" xmlns:r="http://schemas.openxmlformats.org/officeDocument/2006/relationships" xmlns:p="http://schemas.openxmlformats.org/presentationml/2006/main">
+  <p:cSld>
+    <p:spTree>
+      <p:nvGrpSpPr>
+        <p:cNvPr id="1" name=""/>
+        <p:cNvGrpSpPr/>
+        <p:nvPr/>
+      </p:nvGrpSpPr>
+      <p:grpSpPr>
+        <a:xfrm>
+          <a:off x="0" y="0"/>
+          <a:ext cx="0" cy="0"/>
+          <a:chOff x="0" y="0"/>
+          <a:chExt cx="0" cy="0"/>
+        </a:xfrm>
+      </p:grpSpPr>
+      <p:pic>
+        <p:nvPicPr>
+          <p:cNvPr id="5" name="그림 4">
+            <a:extLst>
+              <a:ext uri="{FF2B5EF4-FFF2-40B4-BE49-F238E27FC236}">
+                <a16:creationId xmlns:a16="http://schemas.microsoft.com/office/drawing/2014/main" id="{2A7858E0-CD25-4387-8FAD-5F82CA44C92F}"/>
+              </a:ext>
+            </a:extLst>
+          </p:cNvPr>
+          <p:cNvPicPr>
+            <a:picLocks noChangeAspect="1"/>
+          </p:cNvPicPr>
+          <p:nvPr/>
+        </p:nvPicPr>
+        <p:blipFill>
+          <a:blip r:embed="rId2"/>
+          <a:stretch>
+            <a:fillRect/>
+          </a:stretch>
+        </p:blipFill>
+        <p:spPr>
+          <a:xfrm>
+            <a:off x="927966" y="1128391"/>
+            <a:ext cx="10336067" cy="4601217"/>
+          </a:xfrm>
+          <a:prstGeom prst="rect">
+            <a:avLst/>
+          </a:prstGeom>
+        </p:spPr>
+      </p:pic>
+    </p:spTree>
+    <p:extLst>
+      <p:ext uri="{BB962C8B-B14F-4D97-AF65-F5344CB8AC3E}">
+        <p14:creationId xmlns:p14="http://schemas.microsoft.com/office/powerpoint/2010/main" val="3840409062"/>
+      </p:ext>
+    </p:extLst>
+  </p:cSld>
+  <p:clrMapOvr>
+    <a:masterClrMapping/>
+  </p:clrMapOvr>
+</p:sld>
+</file>
+
+<file path=ppt/slides/slide6.xml><?xml version="1.0" encoding="utf-8"?>
 <p:sld xmlns:a="http://schemas.openxmlformats.org/drawingml/2006/main" xmlns:r="http://schemas.openxmlformats.org/officeDocument/2006/relationships" xmlns:p="http://schemas.openxmlformats.org/presentationml/2006/main">
   <p:cSld>
     <p:bg>
@@ -4361,7 +4370,7 @@
 </p:sld>
 </file>
 
-<file path=ppt/slides/slide6.xml><?xml version="1.0" encoding="utf-8"?>
+<file path=ppt/slides/slide7.xml><?xml version="1.0" encoding="utf-8"?>
 <p:sld xmlns:a="http://schemas.openxmlformats.org/drawingml/2006/main" xmlns:r="http://schemas.openxmlformats.org/officeDocument/2006/relationships" xmlns:p="http://schemas.openxmlformats.org/presentationml/2006/main">
   <p:cSld>
     <p:spTree>
@@ -4430,9 +4439,19 @@
         <p:spPr/>
         <p:txBody>
           <a:bodyPr>
-            <a:normAutofit fontScale="92500" lnSpcReduction="20000"/>
+            <a:normAutofit fontScale="85000" lnSpcReduction="20000"/>
           </a:bodyPr>
           <a:lstStyle/>
+          <a:p>
+            <a:pPr marL="0" indent="0">
+              <a:buNone/>
+            </a:pPr>
+            <a:r>
+              <a:rPr lang="ko-KR" altLang="en-US"/>
+              <a:t>사용자 취향에 따른 영화 추천</a:t>
+            </a:r>
+            <a:endParaRPr lang="en-US" altLang="ko-KR" dirty="0"/>
+          </a:p>
           <a:p>
             <a:pPr marL="0" indent="0">
               <a:buNone/>
@@ -4605,7 +4624,7 @@
 </p:sld>
 </file>
 
-<file path=ppt/slides/slide7.xml><?xml version="1.0" encoding="utf-8"?>
+<file path=ppt/slides/slide8.xml><?xml version="1.0" encoding="utf-8"?>
 <p:sld xmlns:a="http://schemas.openxmlformats.org/drawingml/2006/main" xmlns:r="http://schemas.openxmlformats.org/officeDocument/2006/relationships" xmlns:p="http://schemas.openxmlformats.org/presentationml/2006/main">
   <p:cSld>
     <p:spTree>

</xml_diff>